<commit_message>
updated READMEs, cleaned up code, created test file - not done yet
</commit_message>
<xml_diff>
--- a/Poster/Capstone_Poster.pptx
+++ b/Poster/Capstone_Poster.pptx
@@ -19584,7 +19584,7 @@
         <p:spPr>
           <a:xfrm>
             <a:off x="457200" y="14554200"/>
-            <a:ext cx="21425272" cy="6755993"/>
+            <a:ext cx="19429038" cy="6755993"/>
           </a:xfrm>
           <a:prstGeom prst="rect">
             <a:avLst/>
@@ -19636,7 +19636,7 @@
         <p:spPr>
           <a:xfrm>
             <a:off x="444128" y="9982200"/>
-            <a:ext cx="21425272" cy="4049818"/>
+            <a:ext cx="19358180" cy="4049818"/>
           </a:xfrm>
           <a:prstGeom prst="rect">
             <a:avLst/>
@@ -19687,8 +19687,8 @@
         </p:nvSpPr>
         <p:spPr>
           <a:xfrm>
-            <a:off x="444128" y="5036562"/>
-            <a:ext cx="21425272" cy="4404579"/>
+            <a:off x="444129" y="5036562"/>
+            <a:ext cx="19358180" cy="4404579"/>
           </a:xfrm>
           <a:prstGeom prst="rect">
             <a:avLst/>
@@ -19739,8 +19739,8 @@
         </p:nvSpPr>
         <p:spPr>
           <a:xfrm>
-            <a:off x="22120244" y="5089222"/>
-            <a:ext cx="13990320" cy="12053465"/>
+            <a:off x="20122185" y="5089222"/>
+            <a:ext cx="15988379" cy="12053465"/>
           </a:xfrm>
           <a:prstGeom prst="rect">
             <a:avLst/>
@@ -20987,8 +20987,8 @@
         </p:nvSpPr>
         <p:spPr bwMode="auto">
           <a:xfrm>
-            <a:off x="830513" y="6019800"/>
-            <a:ext cx="20612167" cy="5603725"/>
+            <a:off x="830514" y="6019800"/>
+            <a:ext cx="18799158" cy="6126945"/>
           </a:xfrm>
           <a:prstGeom prst="rect">
             <a:avLst/>
@@ -21204,7 +21204,7 @@
         <p:spPr bwMode="auto">
           <a:xfrm>
             <a:off x="465436" y="15140168"/>
-            <a:ext cx="21411314" cy="9096989"/>
+            <a:ext cx="19270364" cy="9096989"/>
           </a:xfrm>
           <a:prstGeom prst="rect">
             <a:avLst/>
@@ -21913,7 +21913,7 @@
         <p:spPr>
           <a:xfrm>
             <a:off x="444128" y="21832375"/>
-            <a:ext cx="21443248" cy="5307589"/>
+            <a:ext cx="19358180" cy="5307589"/>
           </a:xfrm>
           <a:prstGeom prst="rect">
             <a:avLst/>
@@ -22369,60 +22369,6 @@
               <a:latin typeface="Garamond" panose="02020404030301010803" pitchFamily="18" charset="0"/>
               <a:cs typeface="Gill Sans" panose="020B0502020104020203" pitchFamily="34" charset="-79"/>
             </a:endParaRPr>
-          </a:p>
-        </p:txBody>
-      </p:sp>
-      <p:sp>
-        <p:nvSpPr>
-          <p:cNvPr id="43" name="Oval 42">
-            <a:extLst>
-              <a:ext uri="{FF2B5EF4-FFF2-40B4-BE49-F238E27FC236}">
-                <a16:creationId xmlns:a16="http://schemas.microsoft.com/office/drawing/2014/main" id="{B3911B4A-D3F5-9644-17EE-055A274C33F3}"/>
-              </a:ext>
-            </a:extLst>
-          </p:cNvPr>
-          <p:cNvSpPr/>
-          <p:nvPr/>
-        </p:nvSpPr>
-        <p:spPr>
-          <a:xfrm>
-            <a:off x="731131" y="24447386"/>
-            <a:ext cx="1125395" cy="1134788"/>
-          </a:xfrm>
-          <a:prstGeom prst="ellipse">
-            <a:avLst/>
-          </a:prstGeom>
-          <a:solidFill>
-            <a:srgbClr val="002554"/>
-          </a:solidFill>
-          <a:ln>
-            <a:solidFill>
-              <a:srgbClr val="002454"/>
-            </a:solidFill>
-          </a:ln>
-        </p:spPr>
-        <p:style>
-          <a:lnRef idx="2">
-            <a:schemeClr val="accent1">
-              <a:shade val="15000"/>
-            </a:schemeClr>
-          </a:lnRef>
-          <a:fillRef idx="1">
-            <a:schemeClr val="accent1"/>
-          </a:fillRef>
-          <a:effectRef idx="0">
-            <a:schemeClr val="accent1"/>
-          </a:effectRef>
-          <a:fontRef idx="minor">
-            <a:schemeClr val="lt1"/>
-          </a:fontRef>
-        </p:style>
-        <p:txBody>
-          <a:bodyPr rtlCol="0" anchor="ctr"/>
-          <a:lstStyle/>
-          <a:p>
-            <a:pPr algn="ctr"/>
-            <a:endParaRPr lang="en-US"/>
           </a:p>
         </p:txBody>
       </p:sp>
@@ -22527,53 +22473,6 @@
           </a:extLst>
         </p:spPr>
       </p:pic>
-      <p:pic>
-        <p:nvPicPr>
-          <p:cNvPr id="57" name="Picture 20">
-            <a:extLst>
-              <a:ext uri="{FF2B5EF4-FFF2-40B4-BE49-F238E27FC236}">
-                <a16:creationId xmlns:a16="http://schemas.microsoft.com/office/drawing/2014/main" id="{EC058DC5-9E36-1DA0-20D1-9F919ABFAD82}"/>
-              </a:ext>
-            </a:extLst>
-          </p:cNvPr>
-          <p:cNvPicPr>
-            <a:picLocks noChangeAspect="1" noChangeArrowheads="1"/>
-          </p:cNvPicPr>
-          <p:nvPr/>
-        </p:nvPicPr>
-        <p:blipFill>
-          <a:blip r:embed="rId13">
-            <a:extLst>
-              <a:ext uri="{28A0092B-C50C-407E-A947-70E740481C1C}">
-                <a14:useLocalDpi xmlns:a14="http://schemas.microsoft.com/office/drawing/2010/main" val="0"/>
-              </a:ext>
-            </a:extLst>
-          </a:blip>
-          <a:srcRect/>
-          <a:stretch>
-            <a:fillRect/>
-          </a:stretch>
-        </p:blipFill>
-        <p:spPr bwMode="auto">
-          <a:xfrm>
-            <a:off x="959731" y="24682221"/>
-            <a:ext cx="694939" cy="694939"/>
-          </a:xfrm>
-          <a:prstGeom prst="rect">
-            <a:avLst/>
-          </a:prstGeom>
-          <a:noFill/>
-          <a:extLst>
-            <a:ext uri="{909E8E84-426E-40DD-AFC4-6F175D3DCCD1}">
-              <a14:hiddenFill xmlns:a14="http://schemas.microsoft.com/office/drawing/2010/main">
-                <a:solidFill>
-                  <a:srgbClr val="FFFFFF"/>
-                </a:solidFill>
-              </a14:hiddenFill>
-            </a:ext>
-          </a:extLst>
-        </p:spPr>
-      </p:pic>
       <p:sp>
         <p:nvSpPr>
           <p:cNvPr id="58" name="Text Box 24">
@@ -22954,378 +22853,6 @@
               <a:latin typeface="Garamond" panose="02020404030301010803" pitchFamily="18" charset="0"/>
               <a:cs typeface="Gill Sans" panose="020B0502020104020203" pitchFamily="34" charset="-79"/>
             </a:endParaRPr>
-          </a:p>
-        </p:txBody>
-      </p:sp>
-      <p:sp>
-        <p:nvSpPr>
-          <p:cNvPr id="64" name="Text Box 24">
-            <a:extLst>
-              <a:ext uri="{FF2B5EF4-FFF2-40B4-BE49-F238E27FC236}">
-                <a16:creationId xmlns:a16="http://schemas.microsoft.com/office/drawing/2014/main" id="{1898775E-D4B5-2570-2236-E175B396D16D}"/>
-              </a:ext>
-            </a:extLst>
-          </p:cNvPr>
-          <p:cNvSpPr txBox="1">
-            <a:spLocks noChangeArrowheads="1"/>
-          </p:cNvSpPr>
-          <p:nvPr/>
-        </p:nvSpPr>
-        <p:spPr bwMode="auto">
-          <a:xfrm>
-            <a:off x="1950331" y="24104063"/>
-            <a:ext cx="5325762" cy="1525685"/>
-          </a:xfrm>
-          <a:prstGeom prst="rect">
-            <a:avLst/>
-          </a:prstGeom>
-          <a:noFill/>
-          <a:ln>
-            <a:noFill/>
-          </a:ln>
-          <a:effectLst/>
-          <a:extLst>
-            <a:ext uri="{909E8E84-426E-40DD-AFC4-6F175D3DCCD1}">
-              <a14:hiddenFill xmlns:a14="http://schemas.microsoft.com/office/drawing/2010/main">
-                <a:solidFill>
-                  <a:schemeClr val="accent1"/>
-                </a:solidFill>
-              </a14:hiddenFill>
-            </a:ext>
-            <a:ext uri="{91240B29-F687-4F45-9708-019B960494DF}">
-              <a14:hiddenLine xmlns:a14="http://schemas.microsoft.com/office/drawing/2010/main" w="9525">
-                <a:solidFill>
-                  <a:schemeClr val="tx1"/>
-                </a:solidFill>
-                <a:miter lim="800000"/>
-                <a:headEnd/>
-                <a:tailEnd/>
-              </a14:hiddenLine>
-            </a:ext>
-            <a:ext uri="{AF507438-7753-43E0-B8FC-AC1667EBCBE1}">
-              <a14:hiddenEffects xmlns:a14="http://schemas.microsoft.com/office/drawing/2010/main">
-                <a:effectLst>
-                  <a:outerShdw dist="35921" dir="2700000" algn="ctr" rotWithShape="0">
-                    <a:schemeClr val="bg2"/>
-                  </a:outerShdw>
-                </a:effectLst>
-              </a14:hiddenEffects>
-            </a:ext>
-          </a:extLst>
-        </p:spPr>
-        <p:txBody>
-          <a:bodyPr wrap="square" lIns="352689" tIns="176345" rIns="352689" bIns="176345">
-            <a:spAutoFit/>
-          </a:bodyPr>
-          <a:lstStyle>
-            <a:lvl1pPr eaLnBrk="0" hangingPunct="0">
-              <a:defRPr>
-                <a:solidFill>
-                  <a:schemeClr val="tx1"/>
-                </a:solidFill>
-                <a:latin typeface="Arial" charset="0"/>
-              </a:defRPr>
-            </a:lvl1pPr>
-            <a:lvl2pPr marL="742950" indent="-285750" eaLnBrk="0" hangingPunct="0">
-              <a:defRPr>
-                <a:solidFill>
-                  <a:schemeClr val="tx1"/>
-                </a:solidFill>
-                <a:latin typeface="Arial" charset="0"/>
-              </a:defRPr>
-            </a:lvl2pPr>
-            <a:lvl3pPr marL="1143000" indent="-228600" eaLnBrk="0" hangingPunct="0">
-              <a:defRPr>
-                <a:solidFill>
-                  <a:schemeClr val="tx1"/>
-                </a:solidFill>
-                <a:latin typeface="Arial" charset="0"/>
-              </a:defRPr>
-            </a:lvl3pPr>
-            <a:lvl4pPr marL="1600200" indent="-228600" eaLnBrk="0" hangingPunct="0">
-              <a:defRPr>
-                <a:solidFill>
-                  <a:schemeClr val="tx1"/>
-                </a:solidFill>
-                <a:latin typeface="Arial" charset="0"/>
-              </a:defRPr>
-            </a:lvl4pPr>
-            <a:lvl5pPr marL="2057400" indent="-228600" eaLnBrk="0" hangingPunct="0">
-              <a:defRPr>
-                <a:solidFill>
-                  <a:schemeClr val="tx1"/>
-                </a:solidFill>
-                <a:latin typeface="Arial" charset="0"/>
-              </a:defRPr>
-            </a:lvl5pPr>
-            <a:lvl6pPr marL="2514600" indent="-228600" eaLnBrk="0" fontAlgn="base" hangingPunct="0">
-              <a:spcBef>
-                <a:spcPct val="0"/>
-              </a:spcBef>
-              <a:spcAft>
-                <a:spcPct val="0"/>
-              </a:spcAft>
-              <a:defRPr>
-                <a:solidFill>
-                  <a:schemeClr val="tx1"/>
-                </a:solidFill>
-                <a:latin typeface="Arial" charset="0"/>
-              </a:defRPr>
-            </a:lvl6pPr>
-            <a:lvl7pPr marL="2971800" indent="-228600" eaLnBrk="0" fontAlgn="base" hangingPunct="0">
-              <a:spcBef>
-                <a:spcPct val="0"/>
-              </a:spcBef>
-              <a:spcAft>
-                <a:spcPct val="0"/>
-              </a:spcAft>
-              <a:defRPr>
-                <a:solidFill>
-                  <a:schemeClr val="tx1"/>
-                </a:solidFill>
-                <a:latin typeface="Arial" charset="0"/>
-              </a:defRPr>
-            </a:lvl7pPr>
-            <a:lvl8pPr marL="3429000" indent="-228600" eaLnBrk="0" fontAlgn="base" hangingPunct="0">
-              <a:spcBef>
-                <a:spcPct val="0"/>
-              </a:spcBef>
-              <a:spcAft>
-                <a:spcPct val="0"/>
-              </a:spcAft>
-              <a:defRPr>
-                <a:solidFill>
-                  <a:schemeClr val="tx1"/>
-                </a:solidFill>
-                <a:latin typeface="Arial" charset="0"/>
-              </a:defRPr>
-            </a:lvl8pPr>
-            <a:lvl9pPr marL="3886200" indent="-228600" eaLnBrk="0" fontAlgn="base" hangingPunct="0">
-              <a:spcBef>
-                <a:spcPct val="0"/>
-              </a:spcBef>
-              <a:spcAft>
-                <a:spcPct val="0"/>
-              </a:spcAft>
-              <a:defRPr>
-                <a:solidFill>
-                  <a:schemeClr val="tx1"/>
-                </a:solidFill>
-                <a:latin typeface="Arial" charset="0"/>
-              </a:defRPr>
-            </a:lvl9pPr>
-          </a:lstStyle>
-          <a:p>
-            <a:pPr eaLnBrk="1" hangingPunct="1">
-              <a:spcBef>
-                <a:spcPct val="50000"/>
-              </a:spcBef>
-            </a:pPr>
-            <a:r>
-              <a:rPr lang="en-US" sz="2800" b="1" dirty="0">
-                <a:solidFill>
-                  <a:srgbClr val="000000"/>
-                </a:solidFill>
-                <a:latin typeface="Garamond" panose="02020404030301010803" pitchFamily="18" charset="0"/>
-                <a:cs typeface="Gill Sans" panose="020B0502020104020203" pitchFamily="34" charset="-79"/>
-              </a:rPr>
-              <a:t>Secure Communication</a:t>
-            </a:r>
-            <a:endParaRPr lang="en-US" sz="2200" b="1" dirty="0">
-              <a:solidFill>
-                <a:srgbClr val="000000"/>
-              </a:solidFill>
-              <a:latin typeface="Garamond" panose="02020404030301010803" pitchFamily="18" charset="0"/>
-              <a:cs typeface="Gill Sans" panose="020B0502020104020203" pitchFamily="34" charset="-79"/>
-            </a:endParaRPr>
-          </a:p>
-          <a:p>
-            <a:pPr eaLnBrk="1" hangingPunct="1">
-              <a:spcBef>
-                <a:spcPct val="50000"/>
-              </a:spcBef>
-            </a:pPr>
-            <a:endParaRPr lang="en-US" sz="3200" b="1" dirty="0">
-              <a:latin typeface="Garamond" panose="02020404030301010803" pitchFamily="18" charset="0"/>
-              <a:cs typeface="Gill Sans" panose="020B0502020104020203" pitchFamily="34" charset="-79"/>
-            </a:endParaRPr>
-          </a:p>
-        </p:txBody>
-      </p:sp>
-      <p:sp>
-        <p:nvSpPr>
-          <p:cNvPr id="65" name="Text Box 24">
-            <a:extLst>
-              <a:ext uri="{FF2B5EF4-FFF2-40B4-BE49-F238E27FC236}">
-                <a16:creationId xmlns:a16="http://schemas.microsoft.com/office/drawing/2014/main" id="{3A920EA8-E863-2238-78F1-8586E8B1FAF6}"/>
-              </a:ext>
-            </a:extLst>
-          </p:cNvPr>
-          <p:cNvSpPr txBox="1">
-            <a:spLocks noChangeArrowheads="1"/>
-          </p:cNvSpPr>
-          <p:nvPr/>
-        </p:nvSpPr>
-        <p:spPr bwMode="auto">
-          <a:xfrm>
-            <a:off x="1950331" y="24603512"/>
-            <a:ext cx="4298069" cy="2387460"/>
-          </a:xfrm>
-          <a:prstGeom prst="rect">
-            <a:avLst/>
-          </a:prstGeom>
-          <a:noFill/>
-          <a:ln>
-            <a:noFill/>
-          </a:ln>
-          <a:effectLst/>
-          <a:extLst>
-            <a:ext uri="{909E8E84-426E-40DD-AFC4-6F175D3DCCD1}">
-              <a14:hiddenFill xmlns:a14="http://schemas.microsoft.com/office/drawing/2010/main">
-                <a:solidFill>
-                  <a:schemeClr val="accent1"/>
-                </a:solidFill>
-              </a14:hiddenFill>
-            </a:ext>
-            <a:ext uri="{91240B29-F687-4F45-9708-019B960494DF}">
-              <a14:hiddenLine xmlns:a14="http://schemas.microsoft.com/office/drawing/2010/main" w="9525">
-                <a:solidFill>
-                  <a:schemeClr val="tx1"/>
-                </a:solidFill>
-                <a:miter lim="800000"/>
-                <a:headEnd/>
-                <a:tailEnd/>
-              </a14:hiddenLine>
-            </a:ext>
-            <a:ext uri="{AF507438-7753-43E0-B8FC-AC1667EBCBE1}">
-              <a14:hiddenEffects xmlns:a14="http://schemas.microsoft.com/office/drawing/2010/main">
-                <a:effectLst>
-                  <a:outerShdw dist="35921" dir="2700000" algn="ctr" rotWithShape="0">
-                    <a:schemeClr val="bg2"/>
-                  </a:outerShdw>
-                </a:effectLst>
-              </a14:hiddenEffects>
-            </a:ext>
-          </a:extLst>
-        </p:spPr>
-        <p:txBody>
-          <a:bodyPr wrap="square" lIns="352689" tIns="176345" rIns="352689" bIns="176345">
-            <a:spAutoFit/>
-          </a:bodyPr>
-          <a:lstStyle>
-            <a:lvl1pPr eaLnBrk="0" hangingPunct="0">
-              <a:defRPr>
-                <a:solidFill>
-                  <a:schemeClr val="tx1"/>
-                </a:solidFill>
-                <a:latin typeface="Arial" charset="0"/>
-              </a:defRPr>
-            </a:lvl1pPr>
-            <a:lvl2pPr marL="742950" indent="-285750" eaLnBrk="0" hangingPunct="0">
-              <a:defRPr>
-                <a:solidFill>
-                  <a:schemeClr val="tx1"/>
-                </a:solidFill>
-                <a:latin typeface="Arial" charset="0"/>
-              </a:defRPr>
-            </a:lvl2pPr>
-            <a:lvl3pPr marL="1143000" indent="-228600" eaLnBrk="0" hangingPunct="0">
-              <a:defRPr>
-                <a:solidFill>
-                  <a:schemeClr val="tx1"/>
-                </a:solidFill>
-                <a:latin typeface="Arial" charset="0"/>
-              </a:defRPr>
-            </a:lvl3pPr>
-            <a:lvl4pPr marL="1600200" indent="-228600" eaLnBrk="0" hangingPunct="0">
-              <a:defRPr>
-                <a:solidFill>
-                  <a:schemeClr val="tx1"/>
-                </a:solidFill>
-                <a:latin typeface="Arial" charset="0"/>
-              </a:defRPr>
-            </a:lvl4pPr>
-            <a:lvl5pPr marL="2057400" indent="-228600" eaLnBrk="0" hangingPunct="0">
-              <a:defRPr>
-                <a:solidFill>
-                  <a:schemeClr val="tx1"/>
-                </a:solidFill>
-                <a:latin typeface="Arial" charset="0"/>
-              </a:defRPr>
-            </a:lvl5pPr>
-            <a:lvl6pPr marL="2514600" indent="-228600" eaLnBrk="0" fontAlgn="base" hangingPunct="0">
-              <a:spcBef>
-                <a:spcPct val="0"/>
-              </a:spcBef>
-              <a:spcAft>
-                <a:spcPct val="0"/>
-              </a:spcAft>
-              <a:defRPr>
-                <a:solidFill>
-                  <a:schemeClr val="tx1"/>
-                </a:solidFill>
-                <a:latin typeface="Arial" charset="0"/>
-              </a:defRPr>
-            </a:lvl6pPr>
-            <a:lvl7pPr marL="2971800" indent="-228600" eaLnBrk="0" fontAlgn="base" hangingPunct="0">
-              <a:spcBef>
-                <a:spcPct val="0"/>
-              </a:spcBef>
-              <a:spcAft>
-                <a:spcPct val="0"/>
-              </a:spcAft>
-              <a:defRPr>
-                <a:solidFill>
-                  <a:schemeClr val="tx1"/>
-                </a:solidFill>
-                <a:latin typeface="Arial" charset="0"/>
-              </a:defRPr>
-            </a:lvl7pPr>
-            <a:lvl8pPr marL="3429000" indent="-228600" eaLnBrk="0" fontAlgn="base" hangingPunct="0">
-              <a:spcBef>
-                <a:spcPct val="0"/>
-              </a:spcBef>
-              <a:spcAft>
-                <a:spcPct val="0"/>
-              </a:spcAft>
-              <a:defRPr>
-                <a:solidFill>
-                  <a:schemeClr val="tx1"/>
-                </a:solidFill>
-                <a:latin typeface="Arial" charset="0"/>
-              </a:defRPr>
-            </a:lvl8pPr>
-            <a:lvl9pPr marL="3886200" indent="-228600" eaLnBrk="0" fontAlgn="base" hangingPunct="0">
-              <a:spcBef>
-                <a:spcPct val="0"/>
-              </a:spcBef>
-              <a:spcAft>
-                <a:spcPct val="0"/>
-              </a:spcAft>
-              <a:defRPr>
-                <a:solidFill>
-                  <a:schemeClr val="tx1"/>
-                </a:solidFill>
-                <a:latin typeface="Arial" charset="0"/>
-              </a:defRPr>
-            </a:lvl9pPr>
-          </a:lstStyle>
-          <a:p>
-            <a:pPr eaLnBrk="1" hangingPunct="1">
-              <a:spcBef>
-                <a:spcPct val="50000"/>
-              </a:spcBef>
-            </a:pPr>
-            <a:r>
-              <a:rPr lang="en-US" sz="2200" dirty="0">
-                <a:solidFill>
-                  <a:srgbClr val="000000"/>
-                </a:solidFill>
-                <a:latin typeface="Garamond" panose="02020404030301010803" pitchFamily="18" charset="0"/>
-                <a:cs typeface="Gill Sans" panose="020B0502020104020203" pitchFamily="34" charset="-79"/>
-              </a:rPr>
-              <a:t>Implement a barcode on the race bibs that can be scanned to automatically fill in the runner’s personal information in the medical forms, streamlining the data entry process.</a:t>
-            </a:r>
           </a:p>
         </p:txBody>
       </p:sp>
@@ -23398,7 +22925,7 @@
           <p:nvPr/>
         </p:nvPicPr>
         <p:blipFill>
-          <a:blip r:embed="rId14">
+          <a:blip r:embed="rId13">
             <a:extLst>
               <a:ext uri="{28A0092B-C50C-407E-A947-70E740481C1C}">
                 <a14:useLocalDpi xmlns:a14="http://schemas.microsoft.com/office/drawing/2010/main" val="0"/>
@@ -26033,8 +25560,8 @@
         </p:nvSpPr>
         <p:spPr>
           <a:xfrm>
-            <a:off x="22166504" y="17367777"/>
-            <a:ext cx="13990320" cy="6274798"/>
+            <a:off x="20122185" y="17367777"/>
+            <a:ext cx="16034639" cy="6274798"/>
           </a:xfrm>
           <a:prstGeom prst="rect">
             <a:avLst/>
@@ -26091,8 +25618,8 @@
         </p:nvSpPr>
         <p:spPr>
           <a:xfrm>
-            <a:off x="22245378" y="23902748"/>
-            <a:ext cx="5881337" cy="3237215"/>
+            <a:off x="20183308" y="23902748"/>
+            <a:ext cx="7943407" cy="3237215"/>
           </a:xfrm>
           <a:prstGeom prst="rect">
             <a:avLst/>
@@ -26470,10 +25997,10 @@
           <p:nvPr/>
         </p:nvPicPr>
         <p:blipFill>
-          <a:blip r:embed="rId15">
+          <a:blip r:embed="rId14">
             <a:extLst>
               <a:ext uri="{96DAC541-7B7A-43D3-8B79-37D633B846F1}">
-                <asvg:svgBlip xmlns:asvg="http://schemas.microsoft.com/office/drawing/2016/SVG/main" r:embed="rId16"/>
+                <asvg:svgBlip xmlns:asvg="http://schemas.microsoft.com/office/drawing/2016/SVG/main" r:embed="rId15"/>
               </a:ext>
             </a:extLst>
           </a:blip>
@@ -26506,10 +26033,10 @@
           <p:nvPr/>
         </p:nvPicPr>
         <p:blipFill>
-          <a:blip r:embed="rId17">
+          <a:blip r:embed="rId16">
             <a:extLst>
               <a:ext uri="{96DAC541-7B7A-43D3-8B79-37D633B846F1}">
-                <asvg:svgBlip xmlns:asvg="http://schemas.microsoft.com/office/drawing/2016/SVG/main" r:embed="rId18"/>
+                <asvg:svgBlip xmlns:asvg="http://schemas.microsoft.com/office/drawing/2016/SVG/main" r:embed="rId17"/>
               </a:ext>
             </a:extLst>
           </a:blip>
@@ -26562,10 +26089,10 @@
             <p:nvPr/>
           </p:nvPicPr>
           <p:blipFill>
-            <a:blip r:embed="rId19">
+            <a:blip r:embed="rId18">
               <a:extLst>
                 <a:ext uri="{96DAC541-7B7A-43D3-8B79-37D633B846F1}">
-                  <asvg:svgBlip xmlns:asvg="http://schemas.microsoft.com/office/drawing/2016/SVG/main" r:embed="rId20"/>
+                  <asvg:svgBlip xmlns:asvg="http://schemas.microsoft.com/office/drawing/2016/SVG/main" r:embed="rId19"/>
                 </a:ext>
               </a:extLst>
             </a:blip>
@@ -26598,10 +26125,10 @@
             <p:nvPr/>
           </p:nvPicPr>
           <p:blipFill>
-            <a:blip r:embed="rId21">
+            <a:blip r:embed="rId20">
               <a:extLst>
                 <a:ext uri="{96DAC541-7B7A-43D3-8B79-37D633B846F1}">
-                  <asvg:svgBlip xmlns:asvg="http://schemas.microsoft.com/office/drawing/2016/SVG/main" r:embed="rId22"/>
+                  <asvg:svgBlip xmlns:asvg="http://schemas.microsoft.com/office/drawing/2016/SVG/main" r:embed="rId21"/>
                 </a:ext>
               </a:extLst>
             </a:blip>
@@ -26634,10 +26161,10 @@
             <p:nvPr/>
           </p:nvPicPr>
           <p:blipFill>
-            <a:blip r:embed="rId23">
+            <a:blip r:embed="rId22">
               <a:extLst>
                 <a:ext uri="{96DAC541-7B7A-43D3-8B79-37D633B846F1}">
-                  <asvg:svgBlip xmlns:asvg="http://schemas.microsoft.com/office/drawing/2016/SVG/main" r:embed="rId24"/>
+                  <asvg:svgBlip xmlns:asvg="http://schemas.microsoft.com/office/drawing/2016/SVG/main" r:embed="rId23"/>
                 </a:ext>
               </a:extLst>
             </a:blip>
@@ -27041,10 +26568,10 @@
             <p:nvPr/>
           </p:nvPicPr>
           <p:blipFill>
-            <a:blip r:embed="rId19">
+            <a:blip r:embed="rId18">
               <a:extLst>
                 <a:ext uri="{96DAC541-7B7A-43D3-8B79-37D633B846F1}">
-                  <asvg:svgBlip xmlns:asvg="http://schemas.microsoft.com/office/drawing/2016/SVG/main" r:embed="rId20"/>
+                  <asvg:svgBlip xmlns:asvg="http://schemas.microsoft.com/office/drawing/2016/SVG/main" r:embed="rId19"/>
                 </a:ext>
               </a:extLst>
             </a:blip>
@@ -27077,10 +26604,10 @@
             <p:nvPr/>
           </p:nvPicPr>
           <p:blipFill>
-            <a:blip r:embed="rId21">
+            <a:blip r:embed="rId20">
               <a:extLst>
                 <a:ext uri="{96DAC541-7B7A-43D3-8B79-37D633B846F1}">
-                  <asvg:svgBlip xmlns:asvg="http://schemas.microsoft.com/office/drawing/2016/SVG/main" r:embed="rId22"/>
+                  <asvg:svgBlip xmlns:asvg="http://schemas.microsoft.com/office/drawing/2016/SVG/main" r:embed="rId21"/>
                 </a:ext>
               </a:extLst>
             </a:blip>
@@ -27113,10 +26640,10 @@
             <p:nvPr/>
           </p:nvPicPr>
           <p:blipFill>
-            <a:blip r:embed="rId23">
+            <a:blip r:embed="rId22">
               <a:extLst>
                 <a:ext uri="{96DAC541-7B7A-43D3-8B79-37D633B846F1}">
-                  <asvg:svgBlip xmlns:asvg="http://schemas.microsoft.com/office/drawing/2016/SVG/main" r:embed="rId24"/>
+                  <asvg:svgBlip xmlns:asvg="http://schemas.microsoft.com/office/drawing/2016/SVG/main" r:embed="rId23"/>
                 </a:ext>
               </a:extLst>
             </a:blip>
@@ -27562,10 +27089,10 @@
             <p:nvPr/>
           </p:nvPicPr>
           <p:blipFill>
-            <a:blip r:embed="rId19">
+            <a:blip r:embed="rId18">
               <a:extLst>
                 <a:ext uri="{96DAC541-7B7A-43D3-8B79-37D633B846F1}">
-                  <asvg:svgBlip xmlns:asvg="http://schemas.microsoft.com/office/drawing/2016/SVG/main" r:embed="rId20"/>
+                  <asvg:svgBlip xmlns:asvg="http://schemas.microsoft.com/office/drawing/2016/SVG/main" r:embed="rId19"/>
                 </a:ext>
               </a:extLst>
             </a:blip>
@@ -27598,10 +27125,10 @@
             <p:nvPr/>
           </p:nvPicPr>
           <p:blipFill>
-            <a:blip r:embed="rId21">
+            <a:blip r:embed="rId20">
               <a:extLst>
                 <a:ext uri="{96DAC541-7B7A-43D3-8B79-37D633B846F1}">
-                  <asvg:svgBlip xmlns:asvg="http://schemas.microsoft.com/office/drawing/2016/SVG/main" r:embed="rId22"/>
+                  <asvg:svgBlip xmlns:asvg="http://schemas.microsoft.com/office/drawing/2016/SVG/main" r:embed="rId21"/>
                 </a:ext>
               </a:extLst>
             </a:blip>
@@ -27634,10 +27161,10 @@
             <p:nvPr/>
           </p:nvPicPr>
           <p:blipFill>
-            <a:blip r:embed="rId23">
+            <a:blip r:embed="rId22">
               <a:extLst>
                 <a:ext uri="{96DAC541-7B7A-43D3-8B79-37D633B846F1}">
-                  <asvg:svgBlip xmlns:asvg="http://schemas.microsoft.com/office/drawing/2016/SVG/main" r:embed="rId24"/>
+                  <asvg:svgBlip xmlns:asvg="http://schemas.microsoft.com/office/drawing/2016/SVG/main" r:embed="rId23"/>
                 </a:ext>
               </a:extLst>
             </a:blip>
@@ -28974,10 +28501,10 @@
             <p:nvPr/>
           </p:nvPicPr>
           <p:blipFill>
-            <a:blip r:embed="rId19">
+            <a:blip r:embed="rId18">
               <a:extLst>
                 <a:ext uri="{96DAC541-7B7A-43D3-8B79-37D633B846F1}">
-                  <asvg:svgBlip xmlns:asvg="http://schemas.microsoft.com/office/drawing/2016/SVG/main" r:embed="rId20"/>
+                  <asvg:svgBlip xmlns:asvg="http://schemas.microsoft.com/office/drawing/2016/SVG/main" r:embed="rId19"/>
                 </a:ext>
               </a:extLst>
             </a:blip>
@@ -29010,10 +28537,10 @@
             <p:nvPr/>
           </p:nvPicPr>
           <p:blipFill>
-            <a:blip r:embed="rId23">
+            <a:blip r:embed="rId22">
               <a:extLst>
                 <a:ext uri="{96DAC541-7B7A-43D3-8B79-37D633B846F1}">
-                  <asvg:svgBlip xmlns:asvg="http://schemas.microsoft.com/office/drawing/2016/SVG/main" r:embed="rId24"/>
+                  <asvg:svgBlip xmlns:asvg="http://schemas.microsoft.com/office/drawing/2016/SVG/main" r:embed="rId23"/>
                 </a:ext>
               </a:extLst>
             </a:blip>
@@ -29046,10 +28573,10 @@
             <p:nvPr/>
           </p:nvPicPr>
           <p:blipFill>
-            <a:blip r:embed="rId17">
+            <a:blip r:embed="rId16">
               <a:extLst>
                 <a:ext uri="{96DAC541-7B7A-43D3-8B79-37D633B846F1}">
-                  <asvg:svgBlip xmlns:asvg="http://schemas.microsoft.com/office/drawing/2016/SVG/main" r:embed="rId18"/>
+                  <asvg:svgBlip xmlns:asvg="http://schemas.microsoft.com/office/drawing/2016/SVG/main" r:embed="rId17"/>
                 </a:ext>
               </a:extLst>
             </a:blip>
@@ -29155,10 +28682,10 @@
             <p:nvPr/>
           </p:nvPicPr>
           <p:blipFill>
-            <a:blip r:embed="rId19">
+            <a:blip r:embed="rId18">
               <a:extLst>
                 <a:ext uri="{96DAC541-7B7A-43D3-8B79-37D633B846F1}">
-                  <asvg:svgBlip xmlns:asvg="http://schemas.microsoft.com/office/drawing/2016/SVG/main" r:embed="rId20"/>
+                  <asvg:svgBlip xmlns:asvg="http://schemas.microsoft.com/office/drawing/2016/SVG/main" r:embed="rId19"/>
                 </a:ext>
               </a:extLst>
             </a:blip>
@@ -29191,10 +28718,10 @@
             <p:nvPr/>
           </p:nvPicPr>
           <p:blipFill>
-            <a:blip r:embed="rId21">
+            <a:blip r:embed="rId20">
               <a:extLst>
                 <a:ext uri="{96DAC541-7B7A-43D3-8B79-37D633B846F1}">
-                  <asvg:svgBlip xmlns:asvg="http://schemas.microsoft.com/office/drawing/2016/SVG/main" r:embed="rId22"/>
+                  <asvg:svgBlip xmlns:asvg="http://schemas.microsoft.com/office/drawing/2016/SVG/main" r:embed="rId21"/>
                 </a:ext>
               </a:extLst>
             </a:blip>
@@ -29227,10 +28754,10 @@
             <p:nvPr/>
           </p:nvPicPr>
           <p:blipFill>
-            <a:blip r:embed="rId23">
+            <a:blip r:embed="rId22">
               <a:extLst>
                 <a:ext uri="{96DAC541-7B7A-43D3-8B79-37D633B846F1}">
-                  <asvg:svgBlip xmlns:asvg="http://schemas.microsoft.com/office/drawing/2016/SVG/main" r:embed="rId24"/>
+                  <asvg:svgBlip xmlns:asvg="http://schemas.microsoft.com/office/drawing/2016/SVG/main" r:embed="rId23"/>
                 </a:ext>
               </a:extLst>
             </a:blip>

</xml_diff>